<commit_message>
Changed env w/ pip & more...
- Added pip packages: diskcache, fuzzywuzzy[speedup]
- Added 9 files
- Deleted 20 files
- Modified 34 files
</commit_message>
<xml_diff>
--- a/code/templates/BlueGrey.pptx
+++ b/code/templates/BlueGrey.pptx
@@ -447,7 +447,7 @@
               <a:lnSpc>
                 <a:spcPct val="83000"/>
               </a:lnSpc>
-              <a:defRPr lang="en-US" sz="6800" b="0" kern="1200" cap="all" spc="-100" baseline="0" dirty="0">
+              <a:defRPr lang="en-US" sz="4000" b="0" kern="1200" cap="all" spc="-100" baseline="0" dirty="0">
                 <a:solidFill>
                   <a:schemeClr val="tx1">
                     <a:lumMod val="85000"/>
@@ -463,10 +463,9 @@
           </a:lstStyle>
           <a:p>
             <a:r>
-              <a:rPr lang="en-US"/>
+              <a:rPr lang="en-US" dirty="0"/>
               <a:t>Click to edit Master title style</a:t>
             </a:r>
-            <a:endParaRPr lang="en-US" dirty="0"/>
           </a:p>
         </p:txBody>
       </p:sp>
@@ -501,81 +500,7 @@
           <a:p>
             <a:fld id="{EA0C0817-A112-4847-8014-A94B7D2A4EA3}" type="datetime1">
               <a:rPr lang="en-US" smtClean="0"/>
-              <a:t>9/18/2024</a:t>
-            </a:fld>
-            <a:endParaRPr lang="en-US" dirty="0"/>
-          </a:p>
-        </p:txBody>
-      </p:sp>
-      <p:sp>
-        <p:nvSpPr>
-          <p:cNvPr id="21" name="Footer Placeholder 20"/>
-          <p:cNvSpPr>
-            <a:spLocks noGrp="1"/>
-          </p:cNvSpPr>
-          <p:nvPr>
-            <p:ph type="ftr" sz="quarter" idx="11"/>
-          </p:nvPr>
-        </p:nvSpPr>
-        <p:spPr>
-          <a:xfrm>
-            <a:off x="1629100" y="5177408"/>
-            <a:ext cx="5730295" cy="228600"/>
-          </a:xfrm>
-        </p:spPr>
-        <p:txBody>
-          <a:bodyPr/>
-          <a:lstStyle>
-            <a:lvl1pPr algn="l">
-              <a:defRPr>
-                <a:solidFill>
-                  <a:schemeClr val="tx1">
-                    <a:lumMod val="85000"/>
-                    <a:lumOff val="15000"/>
-                  </a:schemeClr>
-                </a:solidFill>
-              </a:defRPr>
-            </a:lvl1pPr>
-          </a:lstStyle>
-          <a:p>
-            <a:endParaRPr lang="en-US" dirty="0"/>
-          </a:p>
-        </p:txBody>
-      </p:sp>
-      <p:sp>
-        <p:nvSpPr>
-          <p:cNvPr id="22" name="Slide Number Placeholder 21"/>
-          <p:cNvSpPr>
-            <a:spLocks noGrp="1"/>
-          </p:cNvSpPr>
-          <p:nvPr>
-            <p:ph type="sldNum" sz="quarter" idx="12"/>
-          </p:nvPr>
-        </p:nvSpPr>
-        <p:spPr>
-          <a:xfrm>
-            <a:off x="8606920" y="5177408"/>
-            <a:ext cx="1955980" cy="228600"/>
-          </a:xfrm>
-        </p:spPr>
-        <p:txBody>
-          <a:bodyPr/>
-          <a:lstStyle>
-            <a:lvl1pPr>
-              <a:defRPr>
-                <a:solidFill>
-                  <a:schemeClr val="tx1">
-                    <a:lumMod val="85000"/>
-                    <a:lumOff val="15000"/>
-                  </a:schemeClr>
-                </a:solidFill>
-              </a:defRPr>
-            </a:lvl1pPr>
-          </a:lstStyle>
-          <a:p>
-            <a:fld id="{34B7E4EF-A1BD-40F4-AB7B-04F084DD991D}" type="slidenum">
-              <a:rPr lang="en-US" smtClean="0"/>
-              <a:t>‹#›</a:t>
+              <a:t>9/25/2024</a:t>
             </a:fld>
             <a:endParaRPr lang="en-US" dirty="0"/>
           </a:p>
@@ -623,14 +548,19 @@
         </p:nvSpPr>
         <p:spPr/>
         <p:txBody>
-          <a:bodyPr/>
-          <a:lstStyle/>
-          <a:p>
-            <a:r>
-              <a:rPr lang="en-US"/>
+          <a:bodyPr>
+            <a:normAutofit/>
+          </a:bodyPr>
+          <a:lstStyle>
+            <a:lvl1pPr algn="ctr">
+              <a:defRPr sz="4400"/>
+            </a:lvl1pPr>
+          </a:lstStyle>
+          <a:p>
+            <a:r>
+              <a:rPr lang="en-US" dirty="0"/>
               <a:t>Click to edit Master title style</a:t>
             </a:r>
-            <a:endParaRPr lang="en-US" dirty="0"/>
           </a:p>
         </p:txBody>
       </p:sp>
@@ -644,13 +574,32 @@
             <p:ph idx="1"/>
           </p:nvPr>
         </p:nvSpPr>
-        <p:spPr/>
+        <p:spPr>
+          <a:xfrm>
+            <a:off x="2553419" y="2103120"/>
+            <a:ext cx="6961518" cy="3849624"/>
+          </a:xfrm>
+        </p:spPr>
         <p:txBody>
-          <a:bodyPr/>
+          <a:bodyPr>
+            <a:normAutofit/>
+          </a:bodyPr>
           <a:lstStyle>
             <a:lvl1pPr>
-              <a:defRPr sz="2400"/>
+              <a:defRPr sz="4000"/>
             </a:lvl1pPr>
+            <a:lvl2pPr>
+              <a:defRPr sz="2000"/>
+            </a:lvl2pPr>
+            <a:lvl3pPr>
+              <a:defRPr sz="1800"/>
+            </a:lvl3pPr>
+            <a:lvl4pPr>
+              <a:defRPr sz="1800"/>
+            </a:lvl4pPr>
+            <a:lvl5pPr>
+              <a:defRPr sz="1800"/>
+            </a:lvl5pPr>
           </a:lstStyle>
           <a:p>
             <a:pPr lvl="0"/>
@@ -686,71 +635,6 @@
               <a:rPr lang="en-US" dirty="0"/>
               <a:t>Fifth level</a:t>
             </a:r>
-          </a:p>
-        </p:txBody>
-      </p:sp>
-      <p:sp>
-        <p:nvSpPr>
-          <p:cNvPr id="4" name="Date Placeholder 3"/>
-          <p:cNvSpPr>
-            <a:spLocks noGrp="1"/>
-          </p:cNvSpPr>
-          <p:nvPr>
-            <p:ph type="dt" sz="half" idx="10"/>
-          </p:nvPr>
-        </p:nvSpPr>
-        <p:spPr/>
-        <p:txBody>
-          <a:bodyPr/>
-          <a:lstStyle/>
-          <a:p>
-            <a:fld id="{7332B432-ACDA-4023-A761-2BAB76577B62}" type="datetime1">
-              <a:rPr lang="en-US" smtClean="0"/>
-              <a:t>9/18/2024</a:t>
-            </a:fld>
-            <a:endParaRPr lang="en-US" dirty="0"/>
-          </a:p>
-        </p:txBody>
-      </p:sp>
-      <p:sp>
-        <p:nvSpPr>
-          <p:cNvPr id="5" name="Footer Placeholder 4"/>
-          <p:cNvSpPr>
-            <a:spLocks noGrp="1"/>
-          </p:cNvSpPr>
-          <p:nvPr>
-            <p:ph type="ftr" sz="quarter" idx="11"/>
-          </p:nvPr>
-        </p:nvSpPr>
-        <p:spPr/>
-        <p:txBody>
-          <a:bodyPr/>
-          <a:lstStyle/>
-          <a:p>
-            <a:endParaRPr lang="en-US" dirty="0"/>
-          </a:p>
-        </p:txBody>
-      </p:sp>
-      <p:sp>
-        <p:nvSpPr>
-          <p:cNvPr id="6" name="Slide Number Placeholder 5"/>
-          <p:cNvSpPr>
-            <a:spLocks noGrp="1"/>
-          </p:cNvSpPr>
-          <p:nvPr>
-            <p:ph type="sldNum" sz="quarter" idx="12"/>
-          </p:nvPr>
-        </p:nvSpPr>
-        <p:spPr/>
-        <p:txBody>
-          <a:bodyPr/>
-          <a:lstStyle/>
-          <a:p>
-            <a:fld id="{34B7E4EF-A1BD-40F4-AB7B-04F084DD991D}" type="slidenum">
-              <a:rPr lang="en-US" smtClean="0"/>
-              <a:t>‹#›</a:t>
-            </a:fld>
-            <a:endParaRPr lang="en-US" dirty="0"/>
           </a:p>
         </p:txBody>
       </p:sp>
@@ -900,7 +784,7 @@
             <a:normAutofit/>
           </a:bodyPr>
           <a:lstStyle>
-            <a:lvl1pPr algn="l" defTabSz="914400" rtl="0" eaLnBrk="1" latinLnBrk="0" hangingPunct="1">
+            <a:lvl1pPr algn="ctr" defTabSz="914400" rtl="0" eaLnBrk="1" latinLnBrk="0" hangingPunct="1">
               <a:lnSpc>
                 <a:spcPct val="100000"/>
               </a:lnSpc>
@@ -921,10 +805,9 @@
           </a:lstStyle>
           <a:p>
             <a:r>
-              <a:rPr lang="en-US"/>
+              <a:rPr lang="en-US" dirty="0"/>
               <a:t>Click to edit Master title style</a:t>
             </a:r>
-            <a:endParaRPr lang="en-US" dirty="0"/>
           </a:p>
         </p:txBody>
       </p:sp>
@@ -949,14 +832,15 @@
             <a:normAutofit/>
           </a:bodyPr>
           <a:lstStyle>
-            <a:lvl1pPr marL="0" indent="0">
+            <a:lvl1pPr marL="285750" indent="-285750">
               <a:lnSpc>
                 <a:spcPct val="110000"/>
               </a:lnSpc>
               <a:spcBef>
                 <a:spcPts val="800"/>
               </a:spcBef>
-              <a:buNone/>
+              <a:buFont typeface="Arial" panose="020B0604020202020204" pitchFamily="34" charset="0"/>
+              <a:buChar char="•"/>
               <a:defRPr sz="1800">
                 <a:solidFill>
                   <a:schemeClr val="tx1"/>
@@ -1007,112 +891,6 @@
       </p:sp>
       <p:sp>
         <p:nvSpPr>
-          <p:cNvPr id="8" name="Date Placeholder 7"/>
-          <p:cNvSpPr>
-            <a:spLocks noGrp="1"/>
-          </p:cNvSpPr>
-          <p:nvPr>
-            <p:ph type="dt" sz="half" idx="10"/>
-          </p:nvPr>
-        </p:nvSpPr>
-        <p:spPr>
-          <a:xfrm>
-            <a:off x="5588000" y="6035040"/>
-            <a:ext cx="1955800" cy="365760"/>
-          </a:xfrm>
-        </p:spPr>
-        <p:txBody>
-          <a:bodyPr/>
-          <a:lstStyle>
-            <a:lvl1pPr>
-              <a:defRPr>
-                <a:solidFill>
-                  <a:schemeClr val="tx1">
-                    <a:lumMod val="85000"/>
-                    <a:lumOff val="15000"/>
-                  </a:schemeClr>
-                </a:solidFill>
-              </a:defRPr>
-            </a:lvl1pPr>
-          </a:lstStyle>
-          <a:p>
-            <a:fld id="{7E8D12A6-918A-48BD-8CB9-CA713993B0EA}" type="datetime1">
-              <a:rPr lang="en-US" smtClean="0"/>
-              <a:t>9/18/2024</a:t>
-            </a:fld>
-            <a:endParaRPr lang="en-US" dirty="0"/>
-          </a:p>
-        </p:txBody>
-      </p:sp>
-      <p:sp>
-        <p:nvSpPr>
-          <p:cNvPr id="9" name="Footer Placeholder 8"/>
-          <p:cNvSpPr>
-            <a:spLocks noGrp="1"/>
-          </p:cNvSpPr>
-          <p:nvPr>
-            <p:ph type="ftr" sz="quarter" idx="11"/>
-          </p:nvPr>
-        </p:nvSpPr>
-        <p:spPr>
-          <a:xfrm>
-            <a:off x="685801" y="6035040"/>
-            <a:ext cx="4584700" cy="365760"/>
-          </a:xfrm>
-        </p:spPr>
-        <p:txBody>
-          <a:bodyPr/>
-          <a:lstStyle>
-            <a:lvl1pPr algn="l">
-              <a:defRPr/>
-            </a:lvl1pPr>
-          </a:lstStyle>
-          <a:p>
-            <a:endParaRPr lang="en-US" dirty="0"/>
-          </a:p>
-        </p:txBody>
-      </p:sp>
-      <p:sp>
-        <p:nvSpPr>
-          <p:cNvPr id="11" name="Slide Number Placeholder 10"/>
-          <p:cNvSpPr>
-            <a:spLocks noGrp="1"/>
-          </p:cNvSpPr>
-          <p:nvPr>
-            <p:ph type="sldNum" sz="quarter" idx="12"/>
-          </p:nvPr>
-        </p:nvSpPr>
-        <p:spPr>
-          <a:xfrm>
-            <a:off x="10396728" y="6035040"/>
-            <a:ext cx="1223435" cy="365760"/>
-          </a:xfrm>
-        </p:spPr>
-        <p:txBody>
-          <a:bodyPr/>
-          <a:lstStyle>
-            <a:lvl1pPr>
-              <a:defRPr>
-                <a:solidFill>
-                  <a:schemeClr val="tx1">
-                    <a:lumMod val="85000"/>
-                    <a:lumOff val="15000"/>
-                  </a:schemeClr>
-                </a:solidFill>
-              </a:defRPr>
-            </a:lvl1pPr>
-          </a:lstStyle>
-          <a:p>
-            <a:fld id="{34B7E4EF-A1BD-40F4-AB7B-04F084DD991D}" type="slidenum">
-              <a:rPr lang="en-US" smtClean="0"/>
-              <a:t>‹#›</a:t>
-            </a:fld>
-            <a:endParaRPr lang="en-US" dirty="0"/>
-          </a:p>
-        </p:txBody>
-      </p:sp>
-      <p:sp>
-        <p:nvSpPr>
           <p:cNvPr id="6" name="Picture Placeholder 5">
             <a:extLst>
               <a:ext uri="{FF2B5EF4-FFF2-40B4-BE49-F238E27FC236}">
@@ -1129,7 +907,7 @@
         </p:nvSpPr>
         <p:spPr>
           <a:xfrm>
-            <a:off x="781557" y="1786358"/>
+            <a:off x="744731" y="2778396"/>
             <a:ext cx="6654800" cy="3095625"/>
           </a:xfrm>
           <a:ln w="76200">
@@ -1198,95 +976,16 @@
         <p:spPr/>
         <p:txBody>
           <a:bodyPr/>
-          <a:lstStyle/>
-          <a:p>
-            <a:r>
-              <a:rPr lang="en-US"/>
+          <a:lstStyle>
+            <a:lvl1pPr algn="ctr">
+              <a:defRPr/>
+            </a:lvl1pPr>
+          </a:lstStyle>
+          <a:p>
+            <a:r>
+              <a:rPr lang="en-US" dirty="0"/>
               <a:t>Click to edit Master title style</a:t>
             </a:r>
-          </a:p>
-        </p:txBody>
-      </p:sp>
-      <p:sp>
-        <p:nvSpPr>
-          <p:cNvPr id="3" name="Date Placeholder 2">
-            <a:extLst>
-              <a:ext uri="{FF2B5EF4-FFF2-40B4-BE49-F238E27FC236}">
-                <a16:creationId xmlns:a16="http://schemas.microsoft.com/office/drawing/2014/main" id="{C795904F-7F97-DA7E-E859-B6550DAF813E}"/>
-              </a:ext>
-            </a:extLst>
-          </p:cNvPr>
-          <p:cNvSpPr>
-            <a:spLocks noGrp="1"/>
-          </p:cNvSpPr>
-          <p:nvPr>
-            <p:ph type="dt" sz="half" idx="10"/>
-          </p:nvPr>
-        </p:nvSpPr>
-        <p:spPr/>
-        <p:txBody>
-          <a:bodyPr/>
-          <a:lstStyle/>
-          <a:p>
-            <a:fld id="{F6FA2B21-3FCD-4721-B95C-427943F61125}" type="datetime1">
-              <a:rPr lang="en-US" smtClean="0"/>
-              <a:t>9/18/2024</a:t>
-            </a:fld>
-            <a:endParaRPr lang="en-US" dirty="0"/>
-          </a:p>
-        </p:txBody>
-      </p:sp>
-      <p:sp>
-        <p:nvSpPr>
-          <p:cNvPr id="4" name="Footer Placeholder 3">
-            <a:extLst>
-              <a:ext uri="{FF2B5EF4-FFF2-40B4-BE49-F238E27FC236}">
-                <a16:creationId xmlns:a16="http://schemas.microsoft.com/office/drawing/2014/main" id="{42816419-FF5F-E767-1581-0080AC59992F}"/>
-              </a:ext>
-            </a:extLst>
-          </p:cNvPr>
-          <p:cNvSpPr>
-            <a:spLocks noGrp="1"/>
-          </p:cNvSpPr>
-          <p:nvPr>
-            <p:ph type="ftr" sz="quarter" idx="11"/>
-          </p:nvPr>
-        </p:nvSpPr>
-        <p:spPr/>
-        <p:txBody>
-          <a:bodyPr/>
-          <a:lstStyle/>
-          <a:p>
-            <a:endParaRPr lang="en-US" dirty="0"/>
-          </a:p>
-        </p:txBody>
-      </p:sp>
-      <p:sp>
-        <p:nvSpPr>
-          <p:cNvPr id="5" name="Slide Number Placeholder 4">
-            <a:extLst>
-              <a:ext uri="{FF2B5EF4-FFF2-40B4-BE49-F238E27FC236}">
-                <a16:creationId xmlns:a16="http://schemas.microsoft.com/office/drawing/2014/main" id="{6205DA3E-8918-E38A-8C09-68FE1A882C89}"/>
-              </a:ext>
-            </a:extLst>
-          </p:cNvPr>
-          <p:cNvSpPr>
-            <a:spLocks noGrp="1"/>
-          </p:cNvSpPr>
-          <p:nvPr>
-            <p:ph type="sldNum" sz="quarter" idx="12"/>
-          </p:nvPr>
-        </p:nvSpPr>
-        <p:spPr/>
-        <p:txBody>
-          <a:bodyPr/>
-          <a:lstStyle/>
-          <a:p>
-            <a:fld id="{34B7E4EF-A1BD-40F4-AB7B-04F084DD991D}" type="slidenum">
-              <a:rPr lang="en-US" smtClean="0"/>
-              <a:t>‹#›</a:t>
-            </a:fld>
-            <a:endParaRPr lang="en-US" dirty="0"/>
           </a:p>
         </p:txBody>
       </p:sp>
@@ -1313,11 +1012,25 @@
           </a:xfrm>
         </p:spPr>
         <p:txBody>
-          <a:bodyPr/>
+          <a:bodyPr>
+            <a:normAutofit/>
+          </a:bodyPr>
           <a:lstStyle>
             <a:lvl1pPr>
-              <a:defRPr sz="2000"/>
+              <a:defRPr sz="2400"/>
             </a:lvl1pPr>
+            <a:lvl2pPr>
+              <a:defRPr sz="1400"/>
+            </a:lvl2pPr>
+            <a:lvl3pPr>
+              <a:defRPr sz="1200"/>
+            </a:lvl3pPr>
+            <a:lvl4pPr>
+              <a:defRPr sz="1200"/>
+            </a:lvl4pPr>
+            <a:lvl5pPr>
+              <a:defRPr sz="1200"/>
+            </a:lvl5pPr>
           </a:lstStyle>
           <a:p>
             <a:pPr lvl="0"/>
@@ -1374,7 +1087,7 @@
         </p:nvSpPr>
         <p:spPr>
           <a:xfrm>
-            <a:off x="5947742" y="2519363"/>
+            <a:off x="5766587" y="3110256"/>
             <a:ext cx="5489575" cy="3105150"/>
           </a:xfrm>
           <a:ln w="76200">
@@ -1431,6 +1144,180 @@
       </p:grpSpPr>
       <p:sp>
         <p:nvSpPr>
+          <p:cNvPr id="3" name="Rectangle 2">
+            <a:extLst>
+              <a:ext uri="{FF2B5EF4-FFF2-40B4-BE49-F238E27FC236}">
+                <a16:creationId xmlns:a16="http://schemas.microsoft.com/office/drawing/2014/main" id="{48B018E3-837D-82BA-7311-A68564583C1B}"/>
+              </a:ext>
+            </a:extLst>
+          </p:cNvPr>
+          <p:cNvSpPr/>
+          <p:nvPr userDrawn="1"/>
+        </p:nvSpPr>
+        <p:spPr>
+          <a:xfrm>
+            <a:off x="6343651" y="468937"/>
+            <a:ext cx="5103812" cy="5594473"/>
+          </a:xfrm>
+          <a:prstGeom prst="rect">
+            <a:avLst/>
+          </a:prstGeom>
+          <a:solidFill>
+            <a:schemeClr val="bg1"/>
+          </a:solidFill>
+          <a:ln w="76200">
+            <a:solidFill>
+              <a:schemeClr val="accent1"/>
+            </a:solidFill>
+          </a:ln>
+        </p:spPr>
+        <p:style>
+          <a:lnRef idx="2">
+            <a:schemeClr val="accent1">
+              <a:shade val="15000"/>
+            </a:schemeClr>
+          </a:lnRef>
+          <a:fillRef idx="1">
+            <a:schemeClr val="accent1"/>
+          </a:fillRef>
+          <a:effectRef idx="0">
+            <a:schemeClr val="accent1"/>
+          </a:effectRef>
+          <a:fontRef idx="minor">
+            <a:schemeClr val="lt1"/>
+          </a:fontRef>
+        </p:style>
+        <p:txBody>
+          <a:bodyPr rtlCol="0" anchor="ctr"/>
+          <a:lstStyle/>
+          <a:p>
+            <a:pPr algn="ctr"/>
+            <a:endParaRPr lang="en-US"/>
+          </a:p>
+        </p:txBody>
+      </p:sp>
+      <p:pic>
+        <p:nvPicPr>
+          <p:cNvPr id="10" name="Picture 9">
+            <a:extLst>
+              <a:ext uri="{FF2B5EF4-FFF2-40B4-BE49-F238E27FC236}">
+                <a16:creationId xmlns:a16="http://schemas.microsoft.com/office/drawing/2014/main" id="{C3FC5513-A643-90FD-5CBC-5A25230DAE58}"/>
+              </a:ext>
+            </a:extLst>
+          </p:cNvPr>
+          <p:cNvPicPr>
+            <a:picLocks noGrp="1" noRot="1" noChangeAspect="1" noMove="1" noResize="1" noEditPoints="1" noAdjustHandles="1" noChangeArrowheads="1" noChangeShapeType="1" noCrop="1"/>
+          </p:cNvPicPr>
+          <p:nvPr userDrawn="1"/>
+        </p:nvPicPr>
+        <p:blipFill>
+          <a:blip r:embed="rId2"/>
+          <a:stretch>
+            <a:fillRect/>
+          </a:stretch>
+        </p:blipFill>
+        <p:spPr>
+          <a:xfrm>
+            <a:off x="11447464" y="0"/>
+            <a:ext cx="744536" cy="6055742"/>
+          </a:xfrm>
+          <a:prstGeom prst="rect">
+            <a:avLst/>
+          </a:prstGeom>
+        </p:spPr>
+      </p:pic>
+      <p:pic>
+        <p:nvPicPr>
+          <p:cNvPr id="11" name="Picture 10">
+            <a:extLst>
+              <a:ext uri="{FF2B5EF4-FFF2-40B4-BE49-F238E27FC236}">
+                <a16:creationId xmlns:a16="http://schemas.microsoft.com/office/drawing/2014/main" id="{5A4D9306-E87C-4555-2C1F-15E2042E9F7A}"/>
+              </a:ext>
+            </a:extLst>
+          </p:cNvPr>
+          <p:cNvPicPr>
+            <a:picLocks noGrp="1" noRot="1" noChangeAspect="1" noMove="1" noResize="1" noEditPoints="1" noAdjustHandles="1" noChangeArrowheads="1" noChangeShapeType="1" noCrop="1"/>
+          </p:cNvPicPr>
+          <p:nvPr userDrawn="1"/>
+        </p:nvPicPr>
+        <p:blipFill>
+          <a:blip r:embed="rId2"/>
+          <a:stretch>
+            <a:fillRect/>
+          </a:stretch>
+        </p:blipFill>
+        <p:spPr>
+          <a:xfrm>
+            <a:off x="6343651" y="-2"/>
+            <a:ext cx="5107681" cy="468939"/>
+          </a:xfrm>
+          <a:prstGeom prst="rect">
+            <a:avLst/>
+          </a:prstGeom>
+        </p:spPr>
+      </p:pic>
+      <p:pic>
+        <p:nvPicPr>
+          <p:cNvPr id="8" name="Picture 7">
+            <a:extLst>
+              <a:ext uri="{FF2B5EF4-FFF2-40B4-BE49-F238E27FC236}">
+                <a16:creationId xmlns:a16="http://schemas.microsoft.com/office/drawing/2014/main" id="{B12CD25A-D423-ACAC-FA07-00450244F696}"/>
+              </a:ext>
+            </a:extLst>
+          </p:cNvPr>
+          <p:cNvPicPr>
+            <a:picLocks noGrp="1" noRot="1" noChangeAspect="1" noMove="1" noResize="1" noEditPoints="1" noAdjustHandles="1" noChangeArrowheads="1" noChangeShapeType="1" noCrop="1"/>
+          </p:cNvPicPr>
+          <p:nvPr userDrawn="1"/>
+        </p:nvPicPr>
+        <p:blipFill>
+          <a:blip r:embed="rId2"/>
+          <a:stretch>
+            <a:fillRect/>
+          </a:stretch>
+        </p:blipFill>
+        <p:spPr>
+          <a:xfrm>
+            <a:off x="6343652" y="6055742"/>
+            <a:ext cx="5848348" cy="802257"/>
+          </a:xfrm>
+          <a:prstGeom prst="rect">
+            <a:avLst/>
+          </a:prstGeom>
+        </p:spPr>
+      </p:pic>
+      <p:pic>
+        <p:nvPicPr>
+          <p:cNvPr id="6" name="Picture 5">
+            <a:extLst>
+              <a:ext uri="{FF2B5EF4-FFF2-40B4-BE49-F238E27FC236}">
+                <a16:creationId xmlns:a16="http://schemas.microsoft.com/office/drawing/2014/main" id="{E50E7D7A-C5C4-3707-010C-535F1CD2B168}"/>
+              </a:ext>
+            </a:extLst>
+          </p:cNvPr>
+          <p:cNvPicPr>
+            <a:picLocks noGrp="1" noRot="1" noChangeAspect="1" noMove="1" noResize="1" noEditPoints="1" noAdjustHandles="1" noChangeArrowheads="1" noChangeShapeType="1" noCrop="1"/>
+          </p:cNvPicPr>
+          <p:nvPr userDrawn="1"/>
+        </p:nvPicPr>
+        <p:blipFill>
+          <a:blip r:embed="rId3"/>
+          <a:stretch>
+            <a:fillRect/>
+          </a:stretch>
+        </p:blipFill>
+        <p:spPr>
+          <a:xfrm>
+            <a:off x="0" y="0"/>
+            <a:ext cx="6343652" cy="6857999"/>
+          </a:xfrm>
+          <a:prstGeom prst="rect">
+            <a:avLst/>
+          </a:prstGeom>
+        </p:spPr>
+      </p:pic>
+      <p:sp>
+        <p:nvSpPr>
           <p:cNvPr id="2" name="Title 1">
             <a:extLst>
               <a:ext uri="{FF2B5EF4-FFF2-40B4-BE49-F238E27FC236}">
@@ -1447,101 +1334,22 @@
         </p:nvSpPr>
         <p:spPr>
           <a:xfrm>
-            <a:off x="6343652" y="105432"/>
+            <a:off x="6343651" y="476606"/>
             <a:ext cx="5103812" cy="2188236"/>
           </a:xfrm>
         </p:spPr>
         <p:txBody>
           <a:bodyPr/>
-          <a:lstStyle/>
-          <a:p>
-            <a:r>
-              <a:rPr lang="en-US"/>
+          <a:lstStyle>
+            <a:lvl1pPr algn="ctr">
+              <a:defRPr/>
+            </a:lvl1pPr>
+          </a:lstStyle>
+          <a:p>
+            <a:r>
+              <a:rPr lang="en-US" dirty="0"/>
               <a:t>Click to edit Master title style</a:t>
             </a:r>
-          </a:p>
-        </p:txBody>
-      </p:sp>
-      <p:sp>
-        <p:nvSpPr>
-          <p:cNvPr id="3" name="Date Placeholder 2">
-            <a:extLst>
-              <a:ext uri="{FF2B5EF4-FFF2-40B4-BE49-F238E27FC236}">
-                <a16:creationId xmlns:a16="http://schemas.microsoft.com/office/drawing/2014/main" id="{A38E296D-C8D1-F1AC-AEA1-59BCD77D854F}"/>
-              </a:ext>
-            </a:extLst>
-          </p:cNvPr>
-          <p:cNvSpPr>
-            <a:spLocks noGrp="1"/>
-          </p:cNvSpPr>
-          <p:nvPr>
-            <p:ph type="dt" sz="half" idx="10"/>
-          </p:nvPr>
-        </p:nvSpPr>
-        <p:spPr/>
-        <p:txBody>
-          <a:bodyPr/>
-          <a:lstStyle/>
-          <a:p>
-            <a:fld id="{F6FA2B21-3FCD-4721-B95C-427943F61125}" type="datetime1">
-              <a:rPr lang="en-US" smtClean="0"/>
-              <a:t>9/18/2024</a:t>
-            </a:fld>
-            <a:endParaRPr lang="en-US" dirty="0"/>
-          </a:p>
-        </p:txBody>
-      </p:sp>
-      <p:sp>
-        <p:nvSpPr>
-          <p:cNvPr id="4" name="Footer Placeholder 3">
-            <a:extLst>
-              <a:ext uri="{FF2B5EF4-FFF2-40B4-BE49-F238E27FC236}">
-                <a16:creationId xmlns:a16="http://schemas.microsoft.com/office/drawing/2014/main" id="{D8D96878-2D09-8C2C-E6EF-5142905727CF}"/>
-              </a:ext>
-            </a:extLst>
-          </p:cNvPr>
-          <p:cNvSpPr>
-            <a:spLocks noGrp="1"/>
-          </p:cNvSpPr>
-          <p:nvPr>
-            <p:ph type="ftr" sz="quarter" idx="11"/>
-          </p:nvPr>
-        </p:nvSpPr>
-        <p:spPr/>
-        <p:txBody>
-          <a:bodyPr/>
-          <a:lstStyle/>
-          <a:p>
-            <a:endParaRPr lang="en-US" dirty="0"/>
-          </a:p>
-        </p:txBody>
-      </p:sp>
-      <p:sp>
-        <p:nvSpPr>
-          <p:cNvPr id="5" name="Slide Number Placeholder 4">
-            <a:extLst>
-              <a:ext uri="{FF2B5EF4-FFF2-40B4-BE49-F238E27FC236}">
-                <a16:creationId xmlns:a16="http://schemas.microsoft.com/office/drawing/2014/main" id="{83F17D4B-6608-A8C2-5B23-3FD9C0F93D4C}"/>
-              </a:ext>
-            </a:extLst>
-          </p:cNvPr>
-          <p:cNvSpPr>
-            <a:spLocks noGrp="1"/>
-          </p:cNvSpPr>
-          <p:nvPr>
-            <p:ph type="sldNum" sz="quarter" idx="12"/>
-          </p:nvPr>
-        </p:nvSpPr>
-        <p:spPr/>
-        <p:txBody>
-          <a:bodyPr/>
-          <a:lstStyle/>
-          <a:p>
-            <a:fld id="{34B7E4EF-A1BD-40F4-AB7B-04F084DD991D}" type="slidenum">
-              <a:rPr lang="en-US" smtClean="0"/>
-              <a:t>‹#›</a:t>
-            </a:fld>
-            <a:endParaRPr lang="en-US" dirty="0"/>
           </a:p>
         </p:txBody>
       </p:sp>
@@ -1563,16 +1371,30 @@
         </p:nvSpPr>
         <p:spPr>
           <a:xfrm>
-            <a:off x="6343652" y="2293668"/>
-            <a:ext cx="5103812" cy="3390900"/>
+            <a:off x="7082287" y="2918314"/>
+            <a:ext cx="4365176" cy="3145095"/>
           </a:xfrm>
         </p:spPr>
         <p:txBody>
-          <a:bodyPr/>
+          <a:bodyPr anchor="t">
+            <a:normAutofit/>
+          </a:bodyPr>
           <a:lstStyle>
-            <a:lvl1pPr>
-              <a:defRPr sz="2000"/>
+            <a:lvl1pPr algn="l">
+              <a:defRPr sz="2400"/>
             </a:lvl1pPr>
+            <a:lvl2pPr algn="l">
+              <a:defRPr sz="1400"/>
+            </a:lvl2pPr>
+            <a:lvl3pPr algn="l">
+              <a:defRPr sz="1200"/>
+            </a:lvl3pPr>
+            <a:lvl4pPr algn="l">
+              <a:defRPr sz="1200"/>
+            </a:lvl4pPr>
+            <a:lvl5pPr algn="l">
+              <a:defRPr sz="1200"/>
+            </a:lvl5pPr>
           </a:lstStyle>
           <a:p>
             <a:pPr lvl="0"/>
@@ -1629,7 +1451,7 @@
         </p:nvSpPr>
         <p:spPr>
           <a:xfrm>
-            <a:off x="454025" y="1561592"/>
+            <a:off x="514410" y="2372475"/>
             <a:ext cx="5641975" cy="3052762"/>
           </a:xfrm>
           <a:ln w="76200">
@@ -1643,9 +1465,58 @@
           <a:lstStyle/>
           <a:p>
             <a:r>
-              <a:rPr lang="en-US"/>
+              <a:rPr lang="en-US" dirty="0"/>
               <a:t>Click icon to add table</a:t>
             </a:r>
+          </a:p>
+        </p:txBody>
+      </p:sp>
+      <p:sp>
+        <p:nvSpPr>
+          <p:cNvPr id="4" name="Rectangle 3">
+            <a:extLst>
+              <a:ext uri="{FF2B5EF4-FFF2-40B4-BE49-F238E27FC236}">
+                <a16:creationId xmlns:a16="http://schemas.microsoft.com/office/drawing/2014/main" id="{24D47EF4-DABC-DD4B-73BF-99899243280C}"/>
+              </a:ext>
+            </a:extLst>
+          </p:cNvPr>
+          <p:cNvSpPr/>
+          <p:nvPr userDrawn="1"/>
+        </p:nvSpPr>
+        <p:spPr>
+          <a:xfrm>
+            <a:off x="6337750" y="2664842"/>
+            <a:ext cx="5105844" cy="45719"/>
+          </a:xfrm>
+          <a:prstGeom prst="rect">
+            <a:avLst/>
+          </a:prstGeom>
+          <a:ln>
+            <a:noFill/>
+          </a:ln>
+        </p:spPr>
+        <p:style>
+          <a:lnRef idx="2">
+            <a:schemeClr val="accent1">
+              <a:shade val="15000"/>
+            </a:schemeClr>
+          </a:lnRef>
+          <a:fillRef idx="1">
+            <a:schemeClr val="accent1"/>
+          </a:fillRef>
+          <a:effectRef idx="0">
+            <a:schemeClr val="accent1"/>
+          </a:effectRef>
+          <a:fontRef idx="minor">
+            <a:schemeClr val="lt1"/>
+          </a:fontRef>
+        </p:style>
+        <p:txBody>
+          <a:bodyPr rtlCol="0" anchor="ctr"/>
+          <a:lstStyle/>
+          <a:p>
+            <a:pPr algn="ctr"/>
+            <a:endParaRPr lang="en-US"/>
           </a:p>
         </p:txBody>
       </p:sp>
@@ -1920,7 +1791,7 @@
           <a:p>
             <a:fld id="{F6FA2B21-3FCD-4721-B95C-427943F61125}" type="datetime1">
               <a:rPr lang="en-US" smtClean="0"/>
-              <a:t>9/18/2024</a:t>
+              <a:t>9/25/2024</a:t>
             </a:fld>
             <a:endParaRPr lang="en-US" dirty="0"/>
           </a:p>

</xml_diff>